<commit_message>
Add code to separate cell types
</commit_message>
<xml_diff>
--- a/cpsc445Presentation.pptx
+++ b/cpsc445Presentation.pptx
@@ -12,17 +12,17 @@
     <p:sldId id="257" r:id="rId3"/>
     <p:sldId id="258" r:id="rId4"/>
     <p:sldId id="259" r:id="rId5"/>
-    <p:sldId id="261" r:id="rId6"/>
-    <p:sldId id="262" r:id="rId7"/>
-    <p:sldId id="265" r:id="rId8"/>
-    <p:sldId id="264" r:id="rId9"/>
-    <p:sldId id="267" r:id="rId10"/>
-    <p:sldId id="266" r:id="rId11"/>
-    <p:sldId id="268" r:id="rId12"/>
-    <p:sldId id="263" r:id="rId13"/>
-    <p:sldId id="269" r:id="rId14"/>
-    <p:sldId id="270" r:id="rId15"/>
-    <p:sldId id="260" r:id="rId16"/>
+    <p:sldId id="260" r:id="rId6"/>
+    <p:sldId id="261" r:id="rId7"/>
+    <p:sldId id="262" r:id="rId8"/>
+    <p:sldId id="265" r:id="rId9"/>
+    <p:sldId id="264" r:id="rId10"/>
+    <p:sldId id="267" r:id="rId11"/>
+    <p:sldId id="266" r:id="rId12"/>
+    <p:sldId id="268" r:id="rId13"/>
+    <p:sldId id="263" r:id="rId14"/>
+    <p:sldId id="269" r:id="rId15"/>
+    <p:sldId id="270" r:id="rId16"/>
   </p:sldIdLst>
   <p:sldSz cx="12192000" cy="6858000"/>
   <p:notesSz cx="6858000" cy="9144000"/>
@@ -450,7 +450,7 @@
           <a:p>
             <a:fld id="{17678552-9710-40DD-AA4F-1C19A533D258}" type="datetimeFigureOut">
               <a:rPr lang="en-US" smtClean="0"/>
-              <a:t>4/11/2023</a:t>
+              <a:t>4/11/23</a:t>
             </a:fld>
             <a:endParaRPr lang="en-US"/>
           </a:p>
@@ -869,49 +869,7 @@
           <a:bodyPr/>
           <a:lstStyle/>
           <a:p>
-            <a:r>
-              <a:rPr lang="en-US" dirty="0"/>
-              <a:t>One important characteristic of </a:t>
-            </a:r>
-            <a:r>
-              <a:rPr lang="en-US" dirty="0" err="1"/>
-              <a:t>scRNA</a:t>
-            </a:r>
-            <a:r>
-              <a:rPr lang="en-US" dirty="0"/>
-              <a:t>-seq data that feeds into all these challenges is a phenomenon called “dropout”, where a gene is observed at a low or moderate expression level in one cell but is not detected in another cell of the same cell type</a:t>
-            </a:r>
-          </a:p>
-          <a:p>
             <a:endParaRPr lang="en-US" dirty="0"/>
-          </a:p>
-          <a:p>
-            <a:r>
-              <a:rPr lang="en-US" dirty="0"/>
-              <a:t>SENSITIVITY: </a:t>
-            </a:r>
-            <a:r>
-              <a:rPr lang="en-US" b="1" dirty="0"/>
-              <a:t>TP/TP+FN, </a:t>
-            </a:r>
-            <a:r>
-              <a:rPr lang="en-US" dirty="0"/>
-              <a:t>probability that an actual positive will test positive</a:t>
-            </a:r>
-          </a:p>
-          <a:p>
-            <a:r>
-              <a:rPr lang="en-US" dirty="0"/>
-              <a:t>PRECISION: </a:t>
-            </a:r>
-            <a:r>
-              <a:rPr lang="en-US" b="1" dirty="0"/>
-              <a:t>TP/TP+FP, </a:t>
-            </a:r>
-            <a:r>
-              <a:rPr lang="en-US" i="0" dirty="0"/>
-              <a:t>proportion of cases giving positive test results amongst those labeled as positive</a:t>
-            </a:r>
           </a:p>
         </p:txBody>
       </p:sp>
@@ -941,7 +899,7 @@
     </p:spTree>
     <p:extLst>
       <p:ext uri="{BB962C8B-B14F-4D97-AF65-F5344CB8AC3E}">
-        <p14:creationId xmlns:p14="http://schemas.microsoft.com/office/powerpoint/2010/main" val="1506489482"/>
+        <p14:creationId xmlns:p14="http://schemas.microsoft.com/office/powerpoint/2010/main" val="3012503803"/>
       </p:ext>
     </p:extLst>
   </p:cSld>
@@ -995,52 +953,49 @@
           <a:bodyPr/>
           <a:lstStyle/>
           <a:p>
-            <a:pPr marL="285750" indent="-285750">
-              <a:buFontTx/>
-              <a:buChar char="-"/>
-            </a:pPr>
-            <a:r>
-              <a:rPr lang="en-US" sz="1800" dirty="0">
-                <a:effectLst/>
-                <a:latin typeface="Calibri" panose="020F0502020204030204" pitchFamily="34" charset="0"/>
-                <a:ea typeface="Calibri" panose="020F0502020204030204" pitchFamily="34" charset="0"/>
-                <a:cs typeface="Times New Roman" panose="02020603050405020304" pitchFamily="18" charset="0"/>
-              </a:rPr>
-              <a:t>Altogether, these results contribute to the wholistic understanding of cell-type and organ specific differences in Crohn’s disease and therefore elude to potential directions for therapeutic development.</a:t>
-            </a:r>
-          </a:p>
-          <a:p>
-            <a:pPr marL="171450" indent="-171450">
-              <a:buFontTx/>
-              <a:buChar char="-"/>
-            </a:pPr>
-            <a:r>
-              <a:rPr lang="en-US" b="0" i="0" dirty="0">
-                <a:solidFill>
-                  <a:srgbClr val="D1D5DB"/>
-                </a:solidFill>
-                <a:effectLst/>
-                <a:latin typeface="Söhne"/>
-              </a:rPr>
-              <a:t>Myofibroblasts are specialized cells that are involved in wound healing, tissue repair, and tissue remodeling</a:t>
-            </a:r>
-          </a:p>
-          <a:p>
-            <a:pPr marL="171450" indent="-171450">
-              <a:buFontTx/>
-              <a:buChar char="-"/>
-            </a:pPr>
-            <a:r>
-              <a:rPr lang="en-US" b="0" i="0" dirty="0">
-                <a:solidFill>
-                  <a:srgbClr val="2E2E2E"/>
-                </a:solidFill>
-                <a:effectLst/>
-                <a:latin typeface="ElsevierGulliver"/>
-              </a:rPr>
-              <a:t>These genes may therefore be involved in CD-related fibrotic strictures and suggest novel therapeutic hypotheses for the management of this complication</a:t>
-            </a:r>
+            <a:r>
+              <a:rPr lang="en-US" dirty="0"/>
+              <a:t>One important characteristic of </a:t>
+            </a:r>
+            <a:r>
+              <a:rPr lang="en-US" dirty="0" err="1"/>
+              <a:t>scRNA</a:t>
+            </a:r>
+            <a:r>
+              <a:rPr lang="en-US" dirty="0"/>
+              <a:t>-seq data that feeds into all these challenges is a phenomenon called “dropout”, where a gene is observed at a low or moderate expression level in one cell but is not detected in another cell of the same cell type</a:t>
+            </a:r>
+          </a:p>
+          <a:p>
             <a:endParaRPr lang="en-US" dirty="0"/>
+          </a:p>
+          <a:p>
+            <a:r>
+              <a:rPr lang="en-US" dirty="0"/>
+              <a:t>SENSITIVITY: </a:t>
+            </a:r>
+            <a:r>
+              <a:rPr lang="en-US" b="1" dirty="0"/>
+              <a:t>TP/TP+FN, </a:t>
+            </a:r>
+            <a:r>
+              <a:rPr lang="en-US" dirty="0"/>
+              <a:t>probability that an actual positive will test positive</a:t>
+            </a:r>
+          </a:p>
+          <a:p>
+            <a:r>
+              <a:rPr lang="en-US" dirty="0"/>
+              <a:t>PRECISION: </a:t>
+            </a:r>
+            <a:r>
+              <a:rPr lang="en-US" b="1" dirty="0"/>
+              <a:t>TP/TP+FP, </a:t>
+            </a:r>
+            <a:r>
+              <a:rPr lang="en-US" i="0" dirty="0"/>
+              <a:t>proportion of cases giving positive test results amongst those labeled as positive</a:t>
+            </a:r>
           </a:p>
         </p:txBody>
       </p:sp>
@@ -1061,7 +1016,7 @@
           <a:p>
             <a:fld id="{737E5D9D-0919-4671-9372-089DE9AECB2C}" type="slidenum">
               <a:rPr lang="en-US" smtClean="0"/>
-              <a:t>15</a:t>
+              <a:t>13</a:t>
             </a:fld>
             <a:endParaRPr lang="en-US"/>
           </a:p>
@@ -1070,7 +1025,7 @@
     </p:spTree>
     <p:extLst>
       <p:ext uri="{BB962C8B-B14F-4D97-AF65-F5344CB8AC3E}">
-        <p14:creationId xmlns:p14="http://schemas.microsoft.com/office/powerpoint/2010/main" val="190068649"/>
+        <p14:creationId xmlns:p14="http://schemas.microsoft.com/office/powerpoint/2010/main" val="1506489482"/>
       </p:ext>
     </p:extLst>
   </p:cSld>
@@ -1365,16 +1320,52 @@
           <a:bodyPr/>
           <a:lstStyle/>
           <a:p>
-            <a:r>
-              <a:rPr lang="en-US" dirty="0"/>
-              <a:t>MAST: Model-based Analysis of Single-cell Transcriptomics</a:t>
-            </a:r>
-          </a:p>
-          <a:p>
-            <a:r>
-              <a:rPr lang="en-US" dirty="0"/>
-              <a:t>Allows for flexible covariates due to linear nature of the model (can easily add variables)</a:t>
-            </a:r>
+            <a:pPr marL="285750" indent="-285750">
+              <a:buFontTx/>
+              <a:buChar char="-"/>
+            </a:pPr>
+            <a:r>
+              <a:rPr lang="en-US" sz="1800" dirty="0">
+                <a:effectLst/>
+                <a:latin typeface="Calibri" panose="020F0502020204030204" pitchFamily="34" charset="0"/>
+                <a:ea typeface="Calibri" panose="020F0502020204030204" pitchFamily="34" charset="0"/>
+                <a:cs typeface="Times New Roman" panose="02020603050405020304" pitchFamily="18" charset="0"/>
+              </a:rPr>
+              <a:t>Altogether, these results contribute to the wholistic understanding of cell-type and organ specific differences in Crohn’s disease and therefore elude to potential directions for therapeutic development.</a:t>
+            </a:r>
+          </a:p>
+          <a:p>
+            <a:pPr marL="171450" indent="-171450">
+              <a:buFontTx/>
+              <a:buChar char="-"/>
+            </a:pPr>
+            <a:r>
+              <a:rPr lang="en-US" b="0" i="0" dirty="0">
+                <a:solidFill>
+                  <a:srgbClr val="D1D5DB"/>
+                </a:solidFill>
+                <a:effectLst/>
+                <a:latin typeface="Söhne"/>
+              </a:rPr>
+              <a:t>Myofibroblasts are specialized cells that are involved in wound healing, tissue repair, and tissue remodeling</a:t>
+            </a:r>
+          </a:p>
+          <a:p>
+            <a:pPr marL="171450" indent="-171450">
+              <a:buFontTx/>
+              <a:buChar char="-"/>
+            </a:pPr>
+            <a:r>
+              <a:rPr lang="en-US" b="0" i="0" dirty="0">
+                <a:solidFill>
+                  <a:srgbClr val="2E2E2E"/>
+                </a:solidFill>
+                <a:effectLst/>
+                <a:latin typeface="ElsevierGulliver"/>
+              </a:rPr>
+              <a:t>These genes may therefore be involved in CD-related fibrotic strictures and suggest novel therapeutic hypotheses for the management of this complication</a:t>
+            </a:r>
+            <a:endParaRPr lang="en-US" dirty="0"/>
           </a:p>
         </p:txBody>
       </p:sp>
@@ -1404,7 +1395,7 @@
     </p:spTree>
     <p:extLst>
       <p:ext uri="{BB962C8B-B14F-4D97-AF65-F5344CB8AC3E}">
-        <p14:creationId xmlns:p14="http://schemas.microsoft.com/office/powerpoint/2010/main" val="4169781073"/>
+        <p14:creationId xmlns:p14="http://schemas.microsoft.com/office/powerpoint/2010/main" val="190068649"/>
       </p:ext>
     </p:extLst>
   </p:cSld>
@@ -1460,53 +1451,13 @@
           <a:p>
             <a:r>
               <a:rPr lang="en-US" dirty="0"/>
-              <a:t>X: covariates</a:t>
-            </a:r>
-          </a:p>
-          <a:p>
-            <a:r>
-              <a:rPr lang="en-US" dirty="0"/>
-              <a:t>Z: probability of a gene being expressed in a cell (binary – 0 or 1)</a:t>
-            </a:r>
-          </a:p>
-          <a:p>
-            <a:r>
-              <a:rPr lang="en-US" dirty="0"/>
-              <a:t>Y|Z: predicts the expression level of a gene given that it is expressed in the cell (i.e., Z=1)</a:t>
-            </a:r>
-          </a:p>
-          <a:p>
-            <a:r>
-              <a:rPr lang="en-US" dirty="0"/>
-              <a:t>CDR (Cellular detection rate): proportion of genes detected in each cell</a:t>
-            </a:r>
-          </a:p>
-          <a:p>
-            <a:pPr marL="171450" indent="-171450">
-              <a:buFontTx/>
-              <a:buChar char="-"/>
-            </a:pPr>
-            <a:r>
-              <a:rPr lang="en-US" dirty="0"/>
-              <a:t>Account for CDR variability by linearly adding this variable as a covariate in the discrete and continuous models (Basically add a column to matrix X)</a:t>
-            </a:r>
-          </a:p>
-          <a:p>
-            <a:pPr marL="171450" indent="-171450">
-              <a:buFontTx/>
-              <a:buChar char="-"/>
-            </a:pPr>
-            <a:r>
-              <a:rPr lang="en-US" dirty="0"/>
-              <a:t>Hypothesis testing </a:t>
-            </a:r>
-            <a:r>
-              <a:rPr lang="en-US" dirty="0" err="1"/>
-              <a:t>w.r.t.</a:t>
-            </a:r>
-            <a:r>
-              <a:rPr lang="en-US" dirty="0"/>
-              <a:t> </a:t>
+              <a:t>MAST: Model-based Analysis of Single-cell Transcriptomics</a:t>
+            </a:r>
+          </a:p>
+          <a:p>
+            <a:r>
+              <a:rPr lang="en-US" dirty="0"/>
+              <a:t>Allows for flexible covariates due to linear nature of the model (can easily add variables)</a:t>
             </a:r>
           </a:p>
         </p:txBody>
@@ -1537,7 +1488,7 @@
     </p:spTree>
     <p:extLst>
       <p:ext uri="{BB962C8B-B14F-4D97-AF65-F5344CB8AC3E}">
-        <p14:creationId xmlns:p14="http://schemas.microsoft.com/office/powerpoint/2010/main" val="2892862920"/>
+        <p14:creationId xmlns:p14="http://schemas.microsoft.com/office/powerpoint/2010/main" val="4169781073"/>
       </p:ext>
     </p:extLst>
   </p:cSld>
@@ -1592,47 +1543,55 @@
           <a:lstStyle/>
           <a:p>
             <a:r>
-              <a:rPr lang="en-US" b="0" i="0" dirty="0">
-                <a:solidFill>
-                  <a:srgbClr val="D1D5DB"/>
-                </a:solidFill>
-                <a:effectLst/>
-                <a:latin typeface="Söhne"/>
-              </a:rPr>
-              <a:t>GLMs: Generalize ordinary linear regression by relating the linear model to the response variables via a </a:t>
-            </a:r>
-            <a:r>
-              <a:rPr lang="en-US" b="0" i="0">
-                <a:solidFill>
-                  <a:srgbClr val="D1D5DB"/>
-                </a:solidFill>
-                <a:effectLst/>
-                <a:latin typeface="Söhne"/>
-              </a:rPr>
-              <a:t>link function</a:t>
-            </a:r>
-          </a:p>
-          <a:p>
-            <a:endParaRPr lang="en-US" b="0" i="0" dirty="0">
-              <a:solidFill>
-                <a:srgbClr val="D1D5DB"/>
-              </a:solidFill>
-              <a:effectLst/>
-              <a:latin typeface="Söhne"/>
-            </a:endParaRPr>
-          </a:p>
-          <a:p>
-            <a:r>
-              <a:rPr lang="en-US" b="0" i="0" dirty="0">
-                <a:solidFill>
-                  <a:srgbClr val="D1D5DB"/>
-                </a:solidFill>
-                <a:effectLst/>
-                <a:latin typeface="Söhne"/>
-              </a:rPr>
-              <a:t>Extend the linear model to accommodate non-normal response variables</a:t>
-            </a:r>
-            <a:endParaRPr lang="en-US" dirty="0"/>
+              <a:rPr lang="en-US" dirty="0"/>
+              <a:t>X: covariates</a:t>
+            </a:r>
+          </a:p>
+          <a:p>
+            <a:r>
+              <a:rPr lang="en-US" dirty="0"/>
+              <a:t>Z: probability of a gene being expressed in a cell (binary – 0 or 1)</a:t>
+            </a:r>
+          </a:p>
+          <a:p>
+            <a:r>
+              <a:rPr lang="en-US" dirty="0"/>
+              <a:t>Y|Z: predicts the expression level of a gene given that it is expressed in the cell (i.e., Z=1)</a:t>
+            </a:r>
+          </a:p>
+          <a:p>
+            <a:r>
+              <a:rPr lang="en-US" dirty="0"/>
+              <a:t>CDR (Cellular detection rate): proportion of genes detected in each cell</a:t>
+            </a:r>
+          </a:p>
+          <a:p>
+            <a:pPr marL="171450" indent="-171450">
+              <a:buFontTx/>
+              <a:buChar char="-"/>
+            </a:pPr>
+            <a:r>
+              <a:rPr lang="en-US" dirty="0"/>
+              <a:t>Account for CDR variability by linearly adding this variable as a covariate in the discrete and continuous models (Basically add a column to matrix X)</a:t>
+            </a:r>
+          </a:p>
+          <a:p>
+            <a:pPr marL="171450" indent="-171450">
+              <a:buFontTx/>
+              <a:buChar char="-"/>
+            </a:pPr>
+            <a:r>
+              <a:rPr lang="en-US" dirty="0"/>
+              <a:t>Hypothesis testing </a:t>
+            </a:r>
+            <a:r>
+              <a:rPr lang="en-US" dirty="0" err="1"/>
+              <a:t>w.r.t.</a:t>
+            </a:r>
+            <a:r>
+              <a:rPr lang="en-US" dirty="0"/>
+              <a:t> </a:t>
+            </a:r>
           </a:p>
         </p:txBody>
       </p:sp>
@@ -1653,7 +1612,7 @@
           <a:p>
             <a:fld id="{737E5D9D-0919-4671-9372-089DE9AECB2C}" type="slidenum">
               <a:rPr lang="en-US" smtClean="0"/>
-              <a:t>8</a:t>
+              <a:t>7</a:t>
             </a:fld>
             <a:endParaRPr lang="en-US"/>
           </a:p>
@@ -1662,7 +1621,7 @@
     </p:spTree>
     <p:extLst>
       <p:ext uri="{BB962C8B-B14F-4D97-AF65-F5344CB8AC3E}">
-        <p14:creationId xmlns:p14="http://schemas.microsoft.com/office/powerpoint/2010/main" val="2900186729"/>
+        <p14:creationId xmlns:p14="http://schemas.microsoft.com/office/powerpoint/2010/main" val="2892862920"/>
       </p:ext>
     </p:extLst>
   </p:cSld>
@@ -1717,98 +1676,36 @@
           <a:lstStyle/>
           <a:p>
             <a:r>
-              <a:rPr lang="en-US" dirty="0"/>
-              <a:t>Normalization: DESeq2 uses a normalization method based on the assumption that the majority of genes are not differentially expressed. It calculates size factors to adjust for library size differences between samples, ensuring accurate comparisons of gene expression levels.</a:t>
-            </a:r>
-          </a:p>
-          <a:p>
-            <a:endParaRPr lang="en-US" dirty="0"/>
-          </a:p>
-          <a:p>
-            <a:r>
-              <a:rPr lang="en-US" dirty="0"/>
-              <a:t>Dispersion estimation: DESeq2 estimates the dispersion of count data, which represents the biological variability among replicates. This is essential for identifying DEGs while minimizing false positives.</a:t>
-            </a:r>
-          </a:p>
-          <a:p>
-            <a:endParaRPr lang="en-US" dirty="0"/>
-          </a:p>
-          <a:p>
-            <a:pPr marL="0" marR="0" lvl="0" indent="0" algn="l" defTabSz="914400" rtl="0" eaLnBrk="1" fontAlgn="auto" latinLnBrk="0" hangingPunct="1">
-              <a:lnSpc>
-                <a:spcPct val="100000"/>
-              </a:lnSpc>
-              <a:spcBef>
-                <a:spcPts val="0"/>
-              </a:spcBef>
-              <a:spcAft>
-                <a:spcPts val="0"/>
-              </a:spcAft>
-              <a:buClrTx/>
-              <a:buSzTx/>
-              <a:buFontTx/>
-              <a:buNone/>
-              <a:tabLst/>
-              <a:defRPr/>
-            </a:pPr>
-            <a:r>
-              <a:rPr lang="en-US" dirty="0"/>
-              <a:t>Dispersion: parameter that Love et al. developed – biological variability between samples - The dispersion parameter links the variance and mean of the count for the negative binomial distribution.</a:t>
-            </a:r>
-          </a:p>
-          <a:p>
-            <a:endParaRPr lang="en-US" dirty="0"/>
-          </a:p>
-          <a:p>
-            <a:r>
-              <a:rPr lang="en-US" dirty="0"/>
-              <a:t>Differential expression analysis: DESeq2 fits a negative binomial generalized linear model to the count data and tests for differential expression using the Wald test or the likelihood ratio test. It provides log2 fold changes, p-values, and adjusted p-values (using the </a:t>
-            </a:r>
-            <a:r>
-              <a:rPr lang="en-US" dirty="0" err="1"/>
-              <a:t>Benjamini</a:t>
-            </a:r>
-            <a:r>
-              <a:rPr lang="en-US" dirty="0"/>
-              <a:t>-Hochberg procedure) to control for false discovery rates.</a:t>
-            </a:r>
-          </a:p>
-          <a:p>
-            <a:endParaRPr lang="en-US" dirty="0"/>
-          </a:p>
-          <a:p>
-            <a:pPr marL="0" marR="0" lvl="0" indent="0" algn="l" defTabSz="914400" rtl="0" eaLnBrk="1" fontAlgn="auto" latinLnBrk="0" hangingPunct="1">
-              <a:lnSpc>
-                <a:spcPct val="100000"/>
-              </a:lnSpc>
-              <a:spcBef>
-                <a:spcPts val="0"/>
-              </a:spcBef>
-              <a:spcAft>
-                <a:spcPts val="0"/>
-              </a:spcAft>
-              <a:buClrTx/>
-              <a:buSzTx/>
-              <a:buFontTx/>
-              <a:buNone/>
-              <a:tabLst/>
-              <a:defRPr/>
-            </a:pPr>
-            <a:r>
-              <a:rPr lang="en-US" dirty="0"/>
-              <a:t>Fold change: is a measure describing how much a quantity changes between an original and a subsequent measurement. </a:t>
-            </a:r>
-          </a:p>
-          <a:p>
-            <a:endParaRPr lang="en-US" dirty="0"/>
-          </a:p>
-          <a:p>
-            <a:r>
-              <a:rPr lang="en-US" dirty="0"/>
-              <a:t>Result visualization: DESeq2 offers various visualization options, including MA plots, volcano plots, and heatmaps, to facilitate the interpretation and presentation of differential expression results.</a:t>
-            </a:r>
-          </a:p>
-          <a:p>
+              <a:rPr lang="en-US" b="0" i="0" dirty="0">
+                <a:solidFill>
+                  <a:srgbClr val="D1D5DB"/>
+                </a:solidFill>
+                <a:effectLst/>
+                <a:latin typeface="Söhne"/>
+              </a:rPr>
+              <a:t>GLMs: Generalize ordinary linear regression by relating the linear model to the response variables via a link function</a:t>
+            </a:r>
+          </a:p>
+          <a:p>
+            <a:endParaRPr lang="en-US" b="0" i="0" dirty="0">
+              <a:solidFill>
+                <a:srgbClr val="D1D5DB"/>
+              </a:solidFill>
+              <a:effectLst/>
+              <a:latin typeface="Söhne"/>
+            </a:endParaRPr>
+          </a:p>
+          <a:p>
+            <a:r>
+              <a:rPr lang="en-US" b="0" i="0" dirty="0">
+                <a:solidFill>
+                  <a:srgbClr val="D1D5DB"/>
+                </a:solidFill>
+                <a:effectLst/>
+                <a:latin typeface="Söhne"/>
+              </a:rPr>
+              <a:t>Extend the linear model to accommodate non-normal response variables</a:t>
+            </a:r>
             <a:endParaRPr lang="en-US" dirty="0"/>
           </a:p>
         </p:txBody>
@@ -1839,7 +1736,7 @@
     </p:spTree>
     <p:extLst>
       <p:ext uri="{BB962C8B-B14F-4D97-AF65-F5344CB8AC3E}">
-        <p14:creationId xmlns:p14="http://schemas.microsoft.com/office/powerpoint/2010/main" val="3733465719"/>
+        <p14:creationId xmlns:p14="http://schemas.microsoft.com/office/powerpoint/2010/main" val="2900186729"/>
       </p:ext>
     </p:extLst>
   </p:cSld>
@@ -1895,7 +1792,7 @@
           <a:p>
             <a:r>
               <a:rPr lang="en-US" dirty="0"/>
-              <a:t>X: covariates (i.e., the elements in design matrix)</a:t>
+              <a:t>Normalization: DESeq2 uses a normalization method based on the assumption that the majority of genes are not differentially expressed. It calculates size factors to adjust for library size differences between samples, ensuring accurate comparisons of gene expression levels.</a:t>
             </a:r>
           </a:p>
           <a:p>
@@ -1904,8 +1801,89 @@
           <a:p>
             <a:r>
               <a:rPr lang="en-US" dirty="0"/>
-              <a:t>ESTIMATING DISPERSION: First, fit negative binomial GLM with the count data &gt; obtain fitted values for mu, and then maximize the “Cox-Reid adjusted likelihood of dispersion” to obtain alpha</a:t>
-            </a:r>
+              <a:t>Dispersion estimation: DESeq2 estimates the dispersion of count data, which represents the biological variability among replicates. This is essential for identifying DEGs while minimizing false positives.</a:t>
+            </a:r>
+          </a:p>
+          <a:p>
+            <a:endParaRPr lang="en-US" dirty="0"/>
+          </a:p>
+          <a:p>
+            <a:pPr marL="0" marR="0" lvl="0" indent="0" algn="l" defTabSz="914400" rtl="0" eaLnBrk="1" fontAlgn="auto" latinLnBrk="0" hangingPunct="1">
+              <a:lnSpc>
+                <a:spcPct val="100000"/>
+              </a:lnSpc>
+              <a:spcBef>
+                <a:spcPts val="0"/>
+              </a:spcBef>
+              <a:spcAft>
+                <a:spcPts val="0"/>
+              </a:spcAft>
+              <a:buClrTx/>
+              <a:buSzTx/>
+              <a:buFontTx/>
+              <a:buNone/>
+              <a:tabLst/>
+              <a:defRPr/>
+            </a:pPr>
+            <a:r>
+              <a:rPr lang="en-US" dirty="0"/>
+              <a:t>Dispersion: parameter that Love et al. developed – biological variability between samples - The dispersion parameter links the variance and mean of the count for the negative binomial distribution.</a:t>
+            </a:r>
+          </a:p>
+          <a:p>
+            <a:endParaRPr lang="en-US" dirty="0"/>
+          </a:p>
+          <a:p>
+            <a:r>
+              <a:rPr lang="en-US" dirty="0"/>
+              <a:t>Differential expression analysis: DESeq2 fits a negative binomial generalized linear model to the count data and tests for differential expression using the Wald test or the likelihood ratio test. It provides log2 fold changes, p-values, and adjusted p-values (using the </a:t>
+            </a:r>
+            <a:r>
+              <a:rPr lang="en-US" dirty="0" err="1"/>
+              <a:t>Benjamini</a:t>
+            </a:r>
+            <a:r>
+              <a:rPr lang="en-US" dirty="0"/>
+              <a:t>-Hochberg procedure) to control for false discovery rates.</a:t>
+            </a:r>
+          </a:p>
+          <a:p>
+            <a:endParaRPr lang="en-US" dirty="0"/>
+          </a:p>
+          <a:p>
+            <a:pPr marL="0" marR="0" lvl="0" indent="0" algn="l" defTabSz="914400" rtl="0" eaLnBrk="1" fontAlgn="auto" latinLnBrk="0" hangingPunct="1">
+              <a:lnSpc>
+                <a:spcPct val="100000"/>
+              </a:lnSpc>
+              <a:spcBef>
+                <a:spcPts val="0"/>
+              </a:spcBef>
+              <a:spcAft>
+                <a:spcPts val="0"/>
+              </a:spcAft>
+              <a:buClrTx/>
+              <a:buSzTx/>
+              <a:buFontTx/>
+              <a:buNone/>
+              <a:tabLst/>
+              <a:defRPr/>
+            </a:pPr>
+            <a:r>
+              <a:rPr lang="en-US" dirty="0"/>
+              <a:t>Fold change: is a measure describing how much a quantity changes between an original and a subsequent measurement. </a:t>
+            </a:r>
+          </a:p>
+          <a:p>
+            <a:endParaRPr lang="en-US" dirty="0"/>
+          </a:p>
+          <a:p>
+            <a:r>
+              <a:rPr lang="en-US" dirty="0"/>
+              <a:t>Result visualization: DESeq2 offers various visualization options, including MA plots, volcano plots, and heatmaps, to facilitate the interpretation and presentation of differential expression results.</a:t>
+            </a:r>
+          </a:p>
+          <a:p>
+            <a:endParaRPr lang="en-US" dirty="0"/>
           </a:p>
         </p:txBody>
       </p:sp>
@@ -1935,7 +1913,7 @@
     </p:spTree>
     <p:extLst>
       <p:ext uri="{BB962C8B-B14F-4D97-AF65-F5344CB8AC3E}">
-        <p14:creationId xmlns:p14="http://schemas.microsoft.com/office/powerpoint/2010/main" val="1063308843"/>
+        <p14:creationId xmlns:p14="http://schemas.microsoft.com/office/powerpoint/2010/main" val="3733465719"/>
       </p:ext>
     </p:extLst>
   </p:cSld>
@@ -1989,6 +1967,53 @@
           <a:bodyPr/>
           <a:lstStyle/>
           <a:p>
+            <a:r>
+              <a:rPr lang="en-US" dirty="0"/>
+              <a:t>X: covariates (i.e., the elements in design matrix)</a:t>
+            </a:r>
+          </a:p>
+          <a:p>
+            <a:endParaRPr lang="en-US" dirty="0"/>
+          </a:p>
+          <a:p>
+            <a:r>
+              <a:rPr lang="en-US" dirty="0"/>
+              <a:t>ESTIMATING DISPERSION: First, fit negative binomial GLM with the count data &gt; obtain fitted values for mu, and then maximize the “Cox-Reid adjusted likelihood of dispersion” to obtain alpha</a:t>
+            </a:r>
+          </a:p>
+          <a:p>
+            <a:endParaRPr lang="en-US" dirty="0"/>
+          </a:p>
+          <a:p>
+            <a:pPr marL="0" marR="0" lvl="0" indent="0" algn="l" defTabSz="914400" rtl="0" eaLnBrk="1" fontAlgn="auto" latinLnBrk="0" hangingPunct="1">
+              <a:lnSpc>
+                <a:spcPct val="100000"/>
+              </a:lnSpc>
+              <a:spcBef>
+                <a:spcPts val="0"/>
+              </a:spcBef>
+              <a:spcAft>
+                <a:spcPts val="0"/>
+              </a:spcAft>
+              <a:buClrTx/>
+              <a:buSzTx/>
+              <a:buFontTx/>
+              <a:buNone/>
+              <a:tabLst/>
+              <a:defRPr/>
+            </a:pPr>
+            <a:r>
+              <a:rPr lang="en-US" b="0" i="0" dirty="0">
+                <a:solidFill>
+                  <a:srgbClr val="D1D5DB"/>
+                </a:solidFill>
+                <a:effectLst/>
+                <a:latin typeface="Söhne"/>
+              </a:rPr>
+              <a:t>GLMs: Generalize ordinary linear regression by relating the linear model to the response variables via a link function</a:t>
+            </a:r>
+          </a:p>
+          <a:p>
             <a:endParaRPr lang="en-US" dirty="0"/>
           </a:p>
         </p:txBody>
@@ -2019,7 +2044,7 @@
     </p:spTree>
     <p:extLst>
       <p:ext uri="{BB962C8B-B14F-4D97-AF65-F5344CB8AC3E}">
-        <p14:creationId xmlns:p14="http://schemas.microsoft.com/office/powerpoint/2010/main" val="3012503803"/>
+        <p14:creationId xmlns:p14="http://schemas.microsoft.com/office/powerpoint/2010/main" val="1063308843"/>
       </p:ext>
     </p:extLst>
   </p:cSld>
@@ -2176,7 +2201,7 @@
           <a:p>
             <a:fld id="{A1FC91CF-9A89-433F-9326-CEE970F8374B}" type="datetimeFigureOut">
               <a:rPr lang="en-US" smtClean="0"/>
-              <a:t>4/11/2023</a:t>
+              <a:t>4/11/23</a:t>
             </a:fld>
             <a:endParaRPr lang="en-US"/>
           </a:p>
@@ -2374,7 +2399,7 @@
           <a:p>
             <a:fld id="{A1FC91CF-9A89-433F-9326-CEE970F8374B}" type="datetimeFigureOut">
               <a:rPr lang="en-US" smtClean="0"/>
-              <a:t>4/11/2023</a:t>
+              <a:t>4/11/23</a:t>
             </a:fld>
             <a:endParaRPr lang="en-US"/>
           </a:p>
@@ -2582,7 +2607,7 @@
           <a:p>
             <a:fld id="{A1FC91CF-9A89-433F-9326-CEE970F8374B}" type="datetimeFigureOut">
               <a:rPr lang="en-US" smtClean="0"/>
-              <a:t>4/11/2023</a:t>
+              <a:t>4/11/23</a:t>
             </a:fld>
             <a:endParaRPr lang="en-US"/>
           </a:p>
@@ -2780,7 +2805,7 @@
           <a:p>
             <a:fld id="{A1FC91CF-9A89-433F-9326-CEE970F8374B}" type="datetimeFigureOut">
               <a:rPr lang="en-US" smtClean="0"/>
-              <a:t>4/11/2023</a:t>
+              <a:t>4/11/23</a:t>
             </a:fld>
             <a:endParaRPr lang="en-US"/>
           </a:p>
@@ -3055,7 +3080,7 @@
           <a:p>
             <a:fld id="{A1FC91CF-9A89-433F-9326-CEE970F8374B}" type="datetimeFigureOut">
               <a:rPr lang="en-US" smtClean="0"/>
-              <a:t>4/11/2023</a:t>
+              <a:t>4/11/23</a:t>
             </a:fld>
             <a:endParaRPr lang="en-US"/>
           </a:p>
@@ -3320,7 +3345,7 @@
           <a:p>
             <a:fld id="{A1FC91CF-9A89-433F-9326-CEE970F8374B}" type="datetimeFigureOut">
               <a:rPr lang="en-US" smtClean="0"/>
-              <a:t>4/11/2023</a:t>
+              <a:t>4/11/23</a:t>
             </a:fld>
             <a:endParaRPr lang="en-US"/>
           </a:p>
@@ -3732,7 +3757,7 @@
           <a:p>
             <a:fld id="{A1FC91CF-9A89-433F-9326-CEE970F8374B}" type="datetimeFigureOut">
               <a:rPr lang="en-US" smtClean="0"/>
-              <a:t>4/11/2023</a:t>
+              <a:t>4/11/23</a:t>
             </a:fld>
             <a:endParaRPr lang="en-US"/>
           </a:p>
@@ -3873,7 +3898,7 @@
           <a:p>
             <a:fld id="{A1FC91CF-9A89-433F-9326-CEE970F8374B}" type="datetimeFigureOut">
               <a:rPr lang="en-US" smtClean="0"/>
-              <a:t>4/11/2023</a:t>
+              <a:t>4/11/23</a:t>
             </a:fld>
             <a:endParaRPr lang="en-US"/>
           </a:p>
@@ -3986,7 +4011,7 @@
           <a:p>
             <a:fld id="{A1FC91CF-9A89-433F-9326-CEE970F8374B}" type="datetimeFigureOut">
               <a:rPr lang="en-US" smtClean="0"/>
-              <a:t>4/11/2023</a:t>
+              <a:t>4/11/23</a:t>
             </a:fld>
             <a:endParaRPr lang="en-US"/>
           </a:p>
@@ -4297,7 +4322,7 @@
           <a:p>
             <a:fld id="{A1FC91CF-9A89-433F-9326-CEE970F8374B}" type="datetimeFigureOut">
               <a:rPr lang="en-US" smtClean="0"/>
-              <a:t>4/11/2023</a:t>
+              <a:t>4/11/23</a:t>
             </a:fld>
             <a:endParaRPr lang="en-US"/>
           </a:p>
@@ -4585,7 +4610,7 @@
           <a:p>
             <a:fld id="{A1FC91CF-9A89-433F-9326-CEE970F8374B}" type="datetimeFigureOut">
               <a:rPr lang="en-US" smtClean="0"/>
-              <a:t>4/11/2023</a:t>
+              <a:t>4/11/23</a:t>
             </a:fld>
             <a:endParaRPr lang="en-US"/>
           </a:p>
@@ -4826,7 +4851,7 @@
           <a:p>
             <a:fld id="{A1FC91CF-9A89-433F-9326-CEE970F8374B}" type="datetimeFigureOut">
               <a:rPr lang="en-US" smtClean="0"/>
-              <a:t>4/11/2023</a:t>
+              <a:t>4/11/23</a:t>
             </a:fld>
             <a:endParaRPr lang="en-US"/>
           </a:p>
@@ -5349,6 +5374,110 @@
           <p:cNvPr id="2" name="Title 1">
             <a:extLst>
               <a:ext uri="{FF2B5EF4-FFF2-40B4-BE49-F238E27FC236}">
+                <a16:creationId xmlns:a16="http://schemas.microsoft.com/office/drawing/2014/main" id="{D484E3FD-EE5C-E1E8-9408-401FA7523D37}"/>
+              </a:ext>
+            </a:extLst>
+          </p:cNvPr>
+          <p:cNvSpPr>
+            <a:spLocks noGrp="1"/>
+          </p:cNvSpPr>
+          <p:nvPr>
+            <p:ph type="title"/>
+          </p:nvPr>
+        </p:nvSpPr>
+        <p:spPr/>
+        <p:txBody>
+          <a:bodyPr/>
+          <a:lstStyle/>
+          <a:p>
+            <a:r>
+              <a:rPr lang="en-US" dirty="0"/>
+              <a:t>Key features of DESeq2</a:t>
+            </a:r>
+          </a:p>
+        </p:txBody>
+      </p:sp>
+      <p:sp>
+        <p:nvSpPr>
+          <p:cNvPr id="3" name="Content Placeholder 2">
+            <a:extLst>
+              <a:ext uri="{FF2B5EF4-FFF2-40B4-BE49-F238E27FC236}">
+                <a16:creationId xmlns:a16="http://schemas.microsoft.com/office/drawing/2014/main" id="{911EEAEE-27E9-DAAE-D539-2A0D8704C456}"/>
+              </a:ext>
+            </a:extLst>
+          </p:cNvPr>
+          <p:cNvSpPr>
+            <a:spLocks noGrp="1"/>
+          </p:cNvSpPr>
+          <p:nvPr>
+            <p:ph idx="1"/>
+          </p:nvPr>
+        </p:nvSpPr>
+        <p:spPr/>
+        <p:txBody>
+          <a:bodyPr/>
+          <a:lstStyle/>
+          <a:p>
+            <a:r>
+              <a:rPr lang="en-US" dirty="0"/>
+              <a:t>Normalization</a:t>
+            </a:r>
+          </a:p>
+          <a:p>
+            <a:r>
+              <a:rPr lang="en-US" dirty="0"/>
+              <a:t>Dispersion estimation &amp; fold change</a:t>
+            </a:r>
+          </a:p>
+          <a:p>
+            <a:r>
+              <a:rPr lang="en-US" dirty="0"/>
+              <a:t>Differential expression analysis</a:t>
+            </a:r>
+          </a:p>
+          <a:p>
+            <a:r>
+              <a:rPr lang="en-US" dirty="0"/>
+              <a:t>Result visualization</a:t>
+            </a:r>
+          </a:p>
+        </p:txBody>
+      </p:sp>
+    </p:spTree>
+    <p:extLst>
+      <p:ext uri="{BB962C8B-B14F-4D97-AF65-F5344CB8AC3E}">
+        <p14:creationId xmlns:p14="http://schemas.microsoft.com/office/powerpoint/2010/main" val="2300574271"/>
+      </p:ext>
+    </p:extLst>
+  </p:cSld>
+  <p:clrMapOvr>
+    <a:masterClrMapping/>
+  </p:clrMapOvr>
+</p:sld>
+</file>
+
+<file path=ppt/slides/slide11.xml><?xml version="1.0" encoding="utf-8"?>
+<p:sld xmlns:a="http://schemas.openxmlformats.org/drawingml/2006/main" xmlns:r="http://schemas.openxmlformats.org/officeDocument/2006/relationships" xmlns:p="http://schemas.openxmlformats.org/presentationml/2006/main">
+  <p:cSld>
+    <p:spTree>
+      <p:nvGrpSpPr>
+        <p:cNvPr id="1" name=""/>
+        <p:cNvGrpSpPr/>
+        <p:nvPr/>
+      </p:nvGrpSpPr>
+      <p:grpSpPr>
+        <a:xfrm>
+          <a:off x="0" y="0"/>
+          <a:ext cx="0" cy="0"/>
+          <a:chOff x="0" y="0"/>
+          <a:chExt cx="0" cy="0"/>
+        </a:xfrm>
+      </p:grpSpPr>
+      <p:sp>
+        <p:nvSpPr>
+          <p:cNvPr id="2" name="Title 1">
+            <a:extLst>
+              <a:ext uri="{FF2B5EF4-FFF2-40B4-BE49-F238E27FC236}">
                 <a16:creationId xmlns:a16="http://schemas.microsoft.com/office/drawing/2014/main" id="{72EF261C-D26E-8AC5-577D-59EC27EF572E}"/>
               </a:ext>
             </a:extLst>
@@ -5693,106 +5822,6 @@
 </p:sld>
 </file>
 
-<file path=ppt/slides/slide11.xml><?xml version="1.0" encoding="utf-8"?>
-<p:sld xmlns:a="http://schemas.openxmlformats.org/drawingml/2006/main" xmlns:r="http://schemas.openxmlformats.org/officeDocument/2006/relationships" xmlns:p="http://schemas.openxmlformats.org/presentationml/2006/main">
-  <p:cSld>
-    <p:spTree>
-      <p:nvGrpSpPr>
-        <p:cNvPr id="1" name=""/>
-        <p:cNvGrpSpPr/>
-        <p:nvPr/>
-      </p:nvGrpSpPr>
-      <p:grpSpPr>
-        <a:xfrm>
-          <a:off x="0" y="0"/>
-          <a:ext cx="0" cy="0"/>
-          <a:chOff x="0" y="0"/>
-          <a:chExt cx="0" cy="0"/>
-        </a:xfrm>
-      </p:grpSpPr>
-      <p:sp>
-        <p:nvSpPr>
-          <p:cNvPr id="2" name="Title 1">
-            <a:extLst>
-              <a:ext uri="{FF2B5EF4-FFF2-40B4-BE49-F238E27FC236}">
-                <a16:creationId xmlns:a16="http://schemas.microsoft.com/office/drawing/2014/main" id="{D2A17CC1-81B7-58D5-909F-E84F8520F6A8}"/>
-              </a:ext>
-            </a:extLst>
-          </p:cNvPr>
-          <p:cNvSpPr>
-            <a:spLocks noGrp="1"/>
-          </p:cNvSpPr>
-          <p:nvPr>
-            <p:ph type="title"/>
-          </p:nvPr>
-        </p:nvSpPr>
-        <p:spPr/>
-        <p:txBody>
-          <a:bodyPr/>
-          <a:lstStyle/>
-          <a:p>
-            <a:r>
-              <a:rPr lang="en-US" dirty="0"/>
-              <a:t>Main findings (Preliminary)</a:t>
-            </a:r>
-          </a:p>
-        </p:txBody>
-      </p:sp>
-      <p:sp>
-        <p:nvSpPr>
-          <p:cNvPr id="3" name="Content Placeholder 2">
-            <a:extLst>
-              <a:ext uri="{FF2B5EF4-FFF2-40B4-BE49-F238E27FC236}">
-                <a16:creationId xmlns:a16="http://schemas.microsoft.com/office/drawing/2014/main" id="{ABFC1F0F-0B9A-A01F-FF9F-9AF27CA0E527}"/>
-              </a:ext>
-            </a:extLst>
-          </p:cNvPr>
-          <p:cNvSpPr>
-            <a:spLocks noGrp="1"/>
-          </p:cNvSpPr>
-          <p:nvPr>
-            <p:ph idx="1"/>
-          </p:nvPr>
-        </p:nvSpPr>
-        <p:spPr/>
-        <p:txBody>
-          <a:bodyPr>
-            <a:normAutofit lnSpcReduction="10000"/>
-          </a:bodyPr>
-          <a:lstStyle/>
-          <a:p>
-            <a:r>
-              <a:rPr lang="en-US" dirty="0"/>
-              <a:t>Differential expression profiles showed some consistency between the CO and TI, particularly in epithelial and stromal cells. However, weak correlations indicate that the two sites behave very differently. </a:t>
-            </a:r>
-          </a:p>
-          <a:p>
-            <a:r>
-              <a:rPr lang="en-US" dirty="0"/>
-              <a:t>Differential expression was more pronounced in the CO compared to the TI, with the transcriptional response to inflammation being more marked in the CO. This difference was particularly strong among epithelial cell types. </a:t>
-            </a:r>
-          </a:p>
-          <a:p>
-            <a:r>
-              <a:rPr lang="en-US" dirty="0"/>
-              <a:t>Immune cells showed the least differential expression in inflammation. This suggests that compositional changes, such as infiltration of activated immune cells, are the main drivers of immune differences.</a:t>
-            </a:r>
-          </a:p>
-        </p:txBody>
-      </p:sp>
-    </p:spTree>
-    <p:extLst>
-      <p:ext uri="{BB962C8B-B14F-4D97-AF65-F5344CB8AC3E}">
-        <p14:creationId xmlns:p14="http://schemas.microsoft.com/office/powerpoint/2010/main" val="2362833774"/>
-      </p:ext>
-    </p:extLst>
-  </p:cSld>
-  <p:clrMapOvr>
-    <a:masterClrMapping/>
-  </p:clrMapOvr>
-</p:sld>
-</file>
-
 <file path=ppt/slides/slide12.xml><?xml version="1.0" encoding="utf-8"?>
 <p:sld xmlns:a="http://schemas.openxmlformats.org/drawingml/2006/main" xmlns:r="http://schemas.openxmlformats.org/officeDocument/2006/relationships" xmlns:p="http://schemas.openxmlformats.org/presentationml/2006/main">
   <p:cSld>
@@ -5815,7 +5844,7 @@
           <p:cNvPr id="2" name="Title 1">
             <a:extLst>
               <a:ext uri="{FF2B5EF4-FFF2-40B4-BE49-F238E27FC236}">
-                <a16:creationId xmlns:a16="http://schemas.microsoft.com/office/drawing/2014/main" id="{E555A222-B23D-6A34-6423-EBE10D0A12C1}"/>
+                <a16:creationId xmlns:a16="http://schemas.microsoft.com/office/drawing/2014/main" id="{D2A17CC1-81B7-58D5-909F-E84F8520F6A8}"/>
               </a:ext>
             </a:extLst>
           </p:cNvPr>
@@ -5833,7 +5862,7 @@
           <a:p>
             <a:r>
               <a:rPr lang="en-US" dirty="0"/>
-              <a:t>MAST vs. DESeq2</a:t>
+              <a:t>Main findings (Preliminary)</a:t>
             </a:r>
           </a:p>
         </p:txBody>
@@ -5843,7 +5872,7 @@
           <p:cNvPr id="3" name="Content Placeholder 2">
             <a:extLst>
               <a:ext uri="{FF2B5EF4-FFF2-40B4-BE49-F238E27FC236}">
-                <a16:creationId xmlns:a16="http://schemas.microsoft.com/office/drawing/2014/main" id="{D6969797-CD26-1A85-A6DA-7F87F13F1128}"/>
+                <a16:creationId xmlns:a16="http://schemas.microsoft.com/office/drawing/2014/main" id="{ABFC1F0F-0B9A-A01F-FF9F-9AF27CA0E527}"/>
               </a:ext>
             </a:extLst>
           </p:cNvPr>
@@ -5857,41 +5886,25 @@
         <p:spPr/>
         <p:txBody>
           <a:bodyPr>
-            <a:normAutofit/>
+            <a:normAutofit lnSpcReduction="10000"/>
           </a:bodyPr>
           <a:lstStyle/>
           <a:p>
             <a:r>
               <a:rPr lang="en-US" dirty="0"/>
-              <a:t>MAST: Particularly good at handling "dropouts" and high variability in </a:t>
-            </a:r>
-            <a:r>
-              <a:rPr lang="en-US" dirty="0" err="1"/>
-              <a:t>scRNA</a:t>
-            </a:r>
-            <a:r>
-              <a:rPr lang="en-US" dirty="0"/>
-              <a:t>-seq data</a:t>
-            </a:r>
-          </a:p>
-          <a:p>
-            <a:r>
-              <a:rPr lang="en-US" dirty="0"/>
-              <a:t>DESeq2: Originally designed for bulk RNA-seq, not optimal for handling dropouts and high variability in </a:t>
-            </a:r>
-            <a:r>
-              <a:rPr lang="en-US" dirty="0" err="1"/>
-              <a:t>scRNA</a:t>
-            </a:r>
-            <a:r>
-              <a:rPr lang="en-US" dirty="0"/>
-              <a:t>-seq data</a:t>
-            </a:r>
-          </a:p>
-          <a:p>
-            <a:r>
-              <a:rPr lang="en-US" dirty="0"/>
-              <a:t>Both MAST and DESeq2 allow for easy expansion of covariates</a:t>
+              <a:t>Differential expression profiles showed some consistency between the CO and TI, particularly in epithelial and stromal cells. However, weak correlations indicate that the two sites behave very differently. </a:t>
+            </a:r>
+          </a:p>
+          <a:p>
+            <a:r>
+              <a:rPr lang="en-US" dirty="0"/>
+              <a:t>Differential expression was more pronounced in the CO compared to the TI, with the transcriptional response to inflammation being more marked in the CO. This difference was particularly strong among epithelial cell types. </a:t>
+            </a:r>
+          </a:p>
+          <a:p>
+            <a:r>
+              <a:rPr lang="en-US" dirty="0"/>
+              <a:t>Immune cells showed the least differential expression in inflammation. This suggests that compositional changes, such as infiltration of activated immune cells, are the main drivers of immune differences.</a:t>
             </a:r>
           </a:p>
         </p:txBody>
@@ -5899,7 +5912,7 @@
     </p:spTree>
     <p:extLst>
       <p:ext uri="{BB962C8B-B14F-4D97-AF65-F5344CB8AC3E}">
-        <p14:creationId xmlns:p14="http://schemas.microsoft.com/office/powerpoint/2010/main" val="4103673194"/>
+        <p14:creationId xmlns:p14="http://schemas.microsoft.com/office/powerpoint/2010/main" val="2362833774"/>
       </p:ext>
     </p:extLst>
   </p:cSld>
@@ -5931,7 +5944,7 @@
           <p:cNvPr id="2" name="Title 1">
             <a:extLst>
               <a:ext uri="{FF2B5EF4-FFF2-40B4-BE49-F238E27FC236}">
-                <a16:creationId xmlns:a16="http://schemas.microsoft.com/office/drawing/2014/main" id="{BF8F45F7-6635-C3F1-111C-A09123B8AE46}"/>
+                <a16:creationId xmlns:a16="http://schemas.microsoft.com/office/drawing/2014/main" id="{E555A222-B23D-6A34-6423-EBE10D0A12C1}"/>
               </a:ext>
             </a:extLst>
           </p:cNvPr>
@@ -5949,7 +5962,7 @@
           <a:p>
             <a:r>
               <a:rPr lang="en-US" dirty="0"/>
-              <a:t>Comparative Analysis of DE Tools (Wang et al., 2019)</a:t>
+              <a:t>MAST vs. DESeq2</a:t>
             </a:r>
           </a:p>
         </p:txBody>
@@ -5959,7 +5972,7 @@
           <p:cNvPr id="3" name="Content Placeholder 2">
             <a:extLst>
               <a:ext uri="{FF2B5EF4-FFF2-40B4-BE49-F238E27FC236}">
-                <a16:creationId xmlns:a16="http://schemas.microsoft.com/office/drawing/2014/main" id="{2BDAFE44-190D-4A8C-D066-DD88ECCE2F0A}"/>
+                <a16:creationId xmlns:a16="http://schemas.microsoft.com/office/drawing/2014/main" id="{D6969797-CD26-1A85-A6DA-7F87F13F1128}"/>
               </a:ext>
             </a:extLst>
           </p:cNvPr>
@@ -5972,24 +5985,42 @@
         </p:nvSpPr>
         <p:spPr/>
         <p:txBody>
-          <a:bodyPr/>
-          <a:lstStyle/>
-          <a:p>
-            <a:r>
-              <a:rPr lang="en-US" dirty="0"/>
-              <a:t>Trade-off between sensitivity and precision</a:t>
-            </a:r>
-          </a:p>
-          <a:p>
-            <a:r>
-              <a:rPr lang="en-US" dirty="0"/>
-              <a:t>MAST: High precision but low sensitivity</a:t>
-            </a:r>
-          </a:p>
-          <a:p>
-            <a:r>
-              <a:rPr lang="en-US" dirty="0"/>
-              <a:t>DESeq2: More balanced performance between sensitivity and precision</a:t>
+          <a:bodyPr>
+            <a:normAutofit/>
+          </a:bodyPr>
+          <a:lstStyle/>
+          <a:p>
+            <a:r>
+              <a:rPr lang="en-US" dirty="0"/>
+              <a:t>MAST: Particularly good at handling "dropouts" and high variability in </a:t>
+            </a:r>
+            <a:r>
+              <a:rPr lang="en-US" dirty="0" err="1"/>
+              <a:t>scRNA</a:t>
+            </a:r>
+            <a:r>
+              <a:rPr lang="en-US" dirty="0"/>
+              <a:t>-seq data</a:t>
+            </a:r>
+          </a:p>
+          <a:p>
+            <a:r>
+              <a:rPr lang="en-US" dirty="0"/>
+              <a:t>DESeq2: Originally designed for bulk RNA-seq, not optimal for handling dropouts and high variability in </a:t>
+            </a:r>
+            <a:r>
+              <a:rPr lang="en-US" dirty="0" err="1"/>
+              <a:t>scRNA</a:t>
+            </a:r>
+            <a:r>
+              <a:rPr lang="en-US" dirty="0"/>
+              <a:t>-seq data</a:t>
+            </a:r>
+          </a:p>
+          <a:p>
+            <a:r>
+              <a:rPr lang="en-US" dirty="0"/>
+              <a:t>Both MAST and DESeq2 allow for easy expansion of covariates</a:t>
             </a:r>
           </a:p>
         </p:txBody>
@@ -5997,7 +6028,7 @@
     </p:spTree>
     <p:extLst>
       <p:ext uri="{BB962C8B-B14F-4D97-AF65-F5344CB8AC3E}">
-        <p14:creationId xmlns:p14="http://schemas.microsoft.com/office/powerpoint/2010/main" val="2198632889"/>
+        <p14:creationId xmlns:p14="http://schemas.microsoft.com/office/powerpoint/2010/main" val="4103673194"/>
       </p:ext>
     </p:extLst>
   </p:cSld>
@@ -6029,7 +6060,7 @@
           <p:cNvPr id="2" name="Title 1">
             <a:extLst>
               <a:ext uri="{FF2B5EF4-FFF2-40B4-BE49-F238E27FC236}">
-                <a16:creationId xmlns:a16="http://schemas.microsoft.com/office/drawing/2014/main" id="{E49F0AAC-D39D-8D0F-097A-0383B629530E}"/>
+                <a16:creationId xmlns:a16="http://schemas.microsoft.com/office/drawing/2014/main" id="{BF8F45F7-6635-C3F1-111C-A09123B8AE46}"/>
               </a:ext>
             </a:extLst>
           </p:cNvPr>
@@ -6047,7 +6078,7 @@
           <a:p>
             <a:r>
               <a:rPr lang="en-US" dirty="0"/>
-              <a:t>Expected Outcomes in Healthy vs. Inflamed Analysis</a:t>
+              <a:t>Comparative Analysis of DE Tools (Wang et al., 2019)</a:t>
             </a:r>
           </a:p>
         </p:txBody>
@@ -6057,7 +6088,7 @@
           <p:cNvPr id="3" name="Content Placeholder 2">
             <a:extLst>
               <a:ext uri="{FF2B5EF4-FFF2-40B4-BE49-F238E27FC236}">
-                <a16:creationId xmlns:a16="http://schemas.microsoft.com/office/drawing/2014/main" id="{AE249F84-1C34-4181-7D2A-A17317BEB7FF}"/>
+                <a16:creationId xmlns:a16="http://schemas.microsoft.com/office/drawing/2014/main" id="{2BDAFE44-190D-4A8C-D066-DD88ECCE2F0A}"/>
               </a:ext>
             </a:extLst>
           </p:cNvPr>
@@ -6075,35 +6106,19 @@
           <a:p>
             <a:r>
               <a:rPr lang="en-US" dirty="0"/>
-              <a:t>DESeq2 may not identify as many up-regulated or down-regulated genes as MAST in the comparison between healthy and inflamed tissues.</a:t>
-            </a:r>
-          </a:p>
-          <a:p>
-            <a:r>
-              <a:rPr lang="en-US" dirty="0"/>
-              <a:t>This could be due to DESeq2's bulk RNA-seq design and less effective handling of dropout events and high variability in </a:t>
-            </a:r>
-            <a:r>
-              <a:rPr lang="en-US" dirty="0" err="1"/>
-              <a:t>scRNA</a:t>
-            </a:r>
-            <a:r>
-              <a:rPr lang="en-US" dirty="0"/>
-              <a:t>-seq data.</a:t>
-            </a:r>
-          </a:p>
-          <a:p>
-            <a:r>
-              <a:rPr lang="en-US" dirty="0"/>
-              <a:t>Researchers should consider the trade-offs between sensitivity and precision when choosing a differential expression analysis tool for </a:t>
-            </a:r>
-            <a:r>
-              <a:rPr lang="en-US" dirty="0" err="1"/>
-              <a:t>scRNA</a:t>
-            </a:r>
-            <a:r>
-              <a:rPr lang="en-US" dirty="0"/>
-              <a:t>-seq data.</a:t>
+              <a:t>Trade-off between sensitivity and precision</a:t>
+            </a:r>
+          </a:p>
+          <a:p>
+            <a:r>
+              <a:rPr lang="en-US" dirty="0"/>
+              <a:t>MAST: High precision but low sensitivity</a:t>
+            </a:r>
+          </a:p>
+          <a:p>
+            <a:r>
+              <a:rPr lang="en-US" dirty="0"/>
+              <a:t>DESeq2: More balanced performance between sensitivity and precision</a:t>
             </a:r>
           </a:p>
         </p:txBody>
@@ -6111,7 +6126,7 @@
     </p:spTree>
     <p:extLst>
       <p:ext uri="{BB962C8B-B14F-4D97-AF65-F5344CB8AC3E}">
-        <p14:creationId xmlns:p14="http://schemas.microsoft.com/office/powerpoint/2010/main" val="2534191992"/>
+        <p14:creationId xmlns:p14="http://schemas.microsoft.com/office/powerpoint/2010/main" val="2198632889"/>
       </p:ext>
     </p:extLst>
   </p:cSld>
@@ -6143,7 +6158,7 @@
           <p:cNvPr id="2" name="Title 1">
             <a:extLst>
               <a:ext uri="{FF2B5EF4-FFF2-40B4-BE49-F238E27FC236}">
-                <a16:creationId xmlns:a16="http://schemas.microsoft.com/office/drawing/2014/main" id="{A057D7B9-BCDA-3615-7691-EE082087EAC4}"/>
+                <a16:creationId xmlns:a16="http://schemas.microsoft.com/office/drawing/2014/main" id="{E49F0AAC-D39D-8D0F-097A-0383B629530E}"/>
               </a:ext>
             </a:extLst>
           </p:cNvPr>
@@ -6161,7 +6176,7 @@
           <a:p>
             <a:r>
               <a:rPr lang="en-US" dirty="0"/>
-              <a:t>Overall Conclusion</a:t>
+              <a:t>Expected Outcomes in Healthy vs. Inflamed Analysis</a:t>
             </a:r>
           </a:p>
         </p:txBody>
@@ -6171,7 +6186,7 @@
           <p:cNvPr id="3" name="Content Placeholder 2">
             <a:extLst>
               <a:ext uri="{FF2B5EF4-FFF2-40B4-BE49-F238E27FC236}">
-                <a16:creationId xmlns:a16="http://schemas.microsoft.com/office/drawing/2014/main" id="{ADAC37DA-57D7-7584-D2C2-5A485CFFDD5A}"/>
+                <a16:creationId xmlns:a16="http://schemas.microsoft.com/office/drawing/2014/main" id="{AE249F84-1C34-4181-7D2A-A17317BEB7FF}"/>
               </a:ext>
             </a:extLst>
           </p:cNvPr>
@@ -6189,20 +6204,35 @@
           <a:p>
             <a:r>
               <a:rPr lang="en-US" dirty="0"/>
-              <a:t>Kong found organ and compartment specific responses to acute and chronic inflammation</a:t>
-            </a:r>
-          </a:p>
-          <a:p>
-            <a:r>
-              <a:rPr lang="en-US" dirty="0"/>
-              <a:t>Most immune changes were in cell composition and transcriptional changes dominated among epithelial and stromal cells</a:t>
-            </a:r>
-          </a:p>
-          <a:p>
-            <a:pPr lvl="1"/>
-            <a:r>
-              <a:rPr lang="en-US" dirty="0"/>
-              <a:t>disease-associated markers of myofibroblast activation were identified</a:t>
+              <a:t>DESeq2 may not identify as many up-regulated or down-regulated genes as MAST in the comparison between healthy and inflamed tissues.</a:t>
+            </a:r>
+          </a:p>
+          <a:p>
+            <a:r>
+              <a:rPr lang="en-US" dirty="0"/>
+              <a:t>This could be due to DESeq2's bulk RNA-seq design and less effective handling of dropout events and high variability in </a:t>
+            </a:r>
+            <a:r>
+              <a:rPr lang="en-US" dirty="0" err="1"/>
+              <a:t>scRNA</a:t>
+            </a:r>
+            <a:r>
+              <a:rPr lang="en-US" dirty="0"/>
+              <a:t>-seq data.</a:t>
+            </a:r>
+          </a:p>
+          <a:p>
+            <a:r>
+              <a:rPr lang="en-US" dirty="0"/>
+              <a:t>Researchers should consider the trade-offs between sensitivity and precision when choosing a differential expression analysis tool for </a:t>
+            </a:r>
+            <a:r>
+              <a:rPr lang="en-US" dirty="0" err="1"/>
+              <a:t>scRNA</a:t>
+            </a:r>
+            <a:r>
+              <a:rPr lang="en-US" dirty="0"/>
+              <a:t>-seq data.</a:t>
             </a:r>
           </a:p>
         </p:txBody>
@@ -6210,7 +6240,7 @@
     </p:spTree>
     <p:extLst>
       <p:ext uri="{BB962C8B-B14F-4D97-AF65-F5344CB8AC3E}">
-        <p14:creationId xmlns:p14="http://schemas.microsoft.com/office/powerpoint/2010/main" val="1860092264"/>
+        <p14:creationId xmlns:p14="http://schemas.microsoft.com/office/powerpoint/2010/main" val="2534191992"/>
       </p:ext>
     </p:extLst>
   </p:cSld>
@@ -6683,6 +6713,105 @@
           <p:cNvPr id="2" name="Title 1">
             <a:extLst>
               <a:ext uri="{FF2B5EF4-FFF2-40B4-BE49-F238E27FC236}">
+                <a16:creationId xmlns:a16="http://schemas.microsoft.com/office/drawing/2014/main" id="{A057D7B9-BCDA-3615-7691-EE082087EAC4}"/>
+              </a:ext>
+            </a:extLst>
+          </p:cNvPr>
+          <p:cNvSpPr>
+            <a:spLocks noGrp="1"/>
+          </p:cNvSpPr>
+          <p:nvPr>
+            <p:ph type="title"/>
+          </p:nvPr>
+        </p:nvSpPr>
+        <p:spPr/>
+        <p:txBody>
+          <a:bodyPr/>
+          <a:lstStyle/>
+          <a:p>
+            <a:r>
+              <a:rPr lang="en-US" dirty="0"/>
+              <a:t>Kong’s Conclusion</a:t>
+            </a:r>
+          </a:p>
+        </p:txBody>
+      </p:sp>
+      <p:sp>
+        <p:nvSpPr>
+          <p:cNvPr id="3" name="Content Placeholder 2">
+            <a:extLst>
+              <a:ext uri="{FF2B5EF4-FFF2-40B4-BE49-F238E27FC236}">
+                <a16:creationId xmlns:a16="http://schemas.microsoft.com/office/drawing/2014/main" id="{ADAC37DA-57D7-7584-D2C2-5A485CFFDD5A}"/>
+              </a:ext>
+            </a:extLst>
+          </p:cNvPr>
+          <p:cNvSpPr>
+            <a:spLocks noGrp="1"/>
+          </p:cNvSpPr>
+          <p:nvPr>
+            <p:ph idx="1"/>
+          </p:nvPr>
+        </p:nvSpPr>
+        <p:spPr/>
+        <p:txBody>
+          <a:bodyPr/>
+          <a:lstStyle/>
+          <a:p>
+            <a:r>
+              <a:rPr lang="en-US" dirty="0"/>
+              <a:t>Kong found organ and compartment specific responses to acute and chronic inflammation</a:t>
+            </a:r>
+          </a:p>
+          <a:p>
+            <a:r>
+              <a:rPr lang="en-US" dirty="0"/>
+              <a:t>Most immune changes were in cell composition and transcriptional changes dominated among epithelial and stromal cells</a:t>
+            </a:r>
+          </a:p>
+          <a:p>
+            <a:pPr lvl="1"/>
+            <a:r>
+              <a:rPr lang="en-US" dirty="0"/>
+              <a:t>disease-associated markers of myofibroblast activation were identified</a:t>
+            </a:r>
+          </a:p>
+        </p:txBody>
+      </p:sp>
+    </p:spTree>
+    <p:extLst>
+      <p:ext uri="{BB962C8B-B14F-4D97-AF65-F5344CB8AC3E}">
+        <p14:creationId xmlns:p14="http://schemas.microsoft.com/office/powerpoint/2010/main" val="1860092264"/>
+      </p:ext>
+    </p:extLst>
+  </p:cSld>
+  <p:clrMapOvr>
+    <a:masterClrMapping/>
+  </p:clrMapOvr>
+</p:sld>
+</file>
+
+<file path=ppt/slides/slide6.xml><?xml version="1.0" encoding="utf-8"?>
+<p:sld xmlns:a="http://schemas.openxmlformats.org/drawingml/2006/main" xmlns:r="http://schemas.openxmlformats.org/officeDocument/2006/relationships" xmlns:p="http://schemas.openxmlformats.org/presentationml/2006/main">
+  <p:cSld>
+    <p:spTree>
+      <p:nvGrpSpPr>
+        <p:cNvPr id="1" name=""/>
+        <p:cNvGrpSpPr/>
+        <p:nvPr/>
+      </p:nvGrpSpPr>
+      <p:grpSpPr>
+        <a:xfrm>
+          <a:off x="0" y="0"/>
+          <a:ext cx="0" cy="0"/>
+          <a:chOff x="0" y="0"/>
+          <a:chExt cx="0" cy="0"/>
+        </a:xfrm>
+      </p:grpSpPr>
+      <p:sp>
+        <p:nvSpPr>
+          <p:cNvPr id="2" name="Title 1">
+            <a:extLst>
+              <a:ext uri="{FF2B5EF4-FFF2-40B4-BE49-F238E27FC236}">
                 <a16:creationId xmlns:a16="http://schemas.microsoft.com/office/drawing/2014/main" id="{3EFC597A-4510-00E7-659F-A6A8871230CC}"/>
               </a:ext>
             </a:extLst>
@@ -6799,7 +6928,7 @@
 </p:sld>
 </file>
 
-<file path=ppt/slides/slide6.xml><?xml version="1.0" encoding="utf-8"?>
+<file path=ppt/slides/slide7.xml><?xml version="1.0" encoding="utf-8"?>
 <p:sld xmlns:a="http://schemas.openxmlformats.org/drawingml/2006/main" xmlns:r="http://schemas.openxmlformats.org/officeDocument/2006/relationships" xmlns:p="http://schemas.openxmlformats.org/presentationml/2006/main">
   <p:cSld>
     <p:spTree>
@@ -7039,7 +7168,7 @@
 </p:sld>
 </file>
 
-<file path=ppt/slides/slide7.xml><?xml version="1.0" encoding="utf-8"?>
+<file path=ppt/slides/slide8.xml><?xml version="1.0" encoding="utf-8"?>
 <p:sld xmlns:a="http://schemas.openxmlformats.org/drawingml/2006/main" xmlns:r="http://schemas.openxmlformats.org/officeDocument/2006/relationships" xmlns:p="http://schemas.openxmlformats.org/presentationml/2006/main">
   <p:cSld>
     <p:spTree>
@@ -7459,104 +7588,6 @@
 </p:sld>
 </file>
 
-<file path=ppt/slides/slide8.xml><?xml version="1.0" encoding="utf-8"?>
-<p:sld xmlns:a="http://schemas.openxmlformats.org/drawingml/2006/main" xmlns:r="http://schemas.openxmlformats.org/officeDocument/2006/relationships" xmlns:p="http://schemas.openxmlformats.org/presentationml/2006/main">
-  <p:cSld>
-    <p:spTree>
-      <p:nvGrpSpPr>
-        <p:cNvPr id="1" name=""/>
-        <p:cNvGrpSpPr/>
-        <p:nvPr/>
-      </p:nvGrpSpPr>
-      <p:grpSpPr>
-        <a:xfrm>
-          <a:off x="0" y="0"/>
-          <a:ext cx="0" cy="0"/>
-          <a:chOff x="0" y="0"/>
-          <a:chExt cx="0" cy="0"/>
-        </a:xfrm>
-      </p:grpSpPr>
-      <p:sp>
-        <p:nvSpPr>
-          <p:cNvPr id="2" name="Title 1">
-            <a:extLst>
-              <a:ext uri="{FF2B5EF4-FFF2-40B4-BE49-F238E27FC236}">
-                <a16:creationId xmlns:a16="http://schemas.microsoft.com/office/drawing/2014/main" id="{E34857E0-4EFA-736F-7C9F-59A4C80672D1}"/>
-              </a:ext>
-            </a:extLst>
-          </p:cNvPr>
-          <p:cNvSpPr>
-            <a:spLocks noGrp="1"/>
-          </p:cNvSpPr>
-          <p:nvPr>
-            <p:ph type="title"/>
-          </p:nvPr>
-        </p:nvSpPr>
-        <p:spPr/>
-        <p:txBody>
-          <a:bodyPr/>
-          <a:lstStyle/>
-          <a:p>
-            <a:r>
-              <a:rPr lang="en-US" dirty="0"/>
-              <a:t>DESeq2</a:t>
-            </a:r>
-          </a:p>
-        </p:txBody>
-      </p:sp>
-      <p:sp>
-        <p:nvSpPr>
-          <p:cNvPr id="3" name="Content Placeholder 2">
-            <a:extLst>
-              <a:ext uri="{FF2B5EF4-FFF2-40B4-BE49-F238E27FC236}">
-                <a16:creationId xmlns:a16="http://schemas.microsoft.com/office/drawing/2014/main" id="{02B125AA-2610-1632-65C1-699553B90C30}"/>
-              </a:ext>
-            </a:extLst>
-          </p:cNvPr>
-          <p:cNvSpPr>
-            <a:spLocks noGrp="1"/>
-          </p:cNvSpPr>
-          <p:nvPr>
-            <p:ph idx="1"/>
-          </p:nvPr>
-        </p:nvSpPr>
-        <p:spPr/>
-        <p:txBody>
-          <a:bodyPr/>
-          <a:lstStyle/>
-          <a:p>
-            <a:r>
-              <a:rPr lang="en-US" dirty="0"/>
-              <a:t>Michael Love, Wolfgang Huber, and Simon Anders (2014)</a:t>
-            </a:r>
-          </a:p>
-          <a:p>
-            <a:r>
-              <a:rPr lang="en-US" dirty="0"/>
-              <a:t>Identify differentially expressed genes (DEGs)</a:t>
-            </a:r>
-          </a:p>
-          <a:p>
-            <a:r>
-              <a:rPr lang="en-US" dirty="0"/>
-              <a:t>Generalized linear model (GLM) based on the negative binomial distribution</a:t>
-            </a:r>
-          </a:p>
-        </p:txBody>
-      </p:sp>
-    </p:spTree>
-    <p:extLst>
-      <p:ext uri="{BB962C8B-B14F-4D97-AF65-F5344CB8AC3E}">
-        <p14:creationId xmlns:p14="http://schemas.microsoft.com/office/powerpoint/2010/main" val="2331975794"/>
-      </p:ext>
-    </p:extLst>
-  </p:cSld>
-  <p:clrMapOvr>
-    <a:masterClrMapping/>
-  </p:clrMapOvr>
-</p:sld>
-</file>
-
 <file path=ppt/slides/slide9.xml><?xml version="1.0" encoding="utf-8"?>
 <p:sld xmlns:a="http://schemas.openxmlformats.org/drawingml/2006/main" xmlns:r="http://schemas.openxmlformats.org/officeDocument/2006/relationships" xmlns:p="http://schemas.openxmlformats.org/presentationml/2006/main">
   <p:cSld>
@@ -7579,7 +7610,7 @@
           <p:cNvPr id="2" name="Title 1">
             <a:extLst>
               <a:ext uri="{FF2B5EF4-FFF2-40B4-BE49-F238E27FC236}">
-                <a16:creationId xmlns:a16="http://schemas.microsoft.com/office/drawing/2014/main" id="{D484E3FD-EE5C-E1E8-9408-401FA7523D37}"/>
+                <a16:creationId xmlns:a16="http://schemas.microsoft.com/office/drawing/2014/main" id="{E34857E0-4EFA-736F-7C9F-59A4C80672D1}"/>
               </a:ext>
             </a:extLst>
           </p:cNvPr>
@@ -7597,7 +7628,7 @@
           <a:p>
             <a:r>
               <a:rPr lang="en-US" dirty="0"/>
-              <a:t>Key features of DESeq2</a:t>
+              <a:t>DESeq2</a:t>
             </a:r>
           </a:p>
         </p:txBody>
@@ -7607,7 +7638,7 @@
           <p:cNvPr id="3" name="Content Placeholder 2">
             <a:extLst>
               <a:ext uri="{FF2B5EF4-FFF2-40B4-BE49-F238E27FC236}">
-                <a16:creationId xmlns:a16="http://schemas.microsoft.com/office/drawing/2014/main" id="{911EEAEE-27E9-DAAE-D539-2A0D8704C456}"/>
+                <a16:creationId xmlns:a16="http://schemas.microsoft.com/office/drawing/2014/main" id="{02B125AA-2610-1632-65C1-699553B90C30}"/>
               </a:ext>
             </a:extLst>
           </p:cNvPr>
@@ -7625,25 +7656,19 @@
           <a:p>
             <a:r>
               <a:rPr lang="en-US" dirty="0"/>
-              <a:t>Normalization</a:t>
-            </a:r>
-          </a:p>
-          <a:p>
-            <a:r>
-              <a:rPr lang="en-US" dirty="0"/>
-              <a:t>Dispersion estimation</a:t>
-            </a:r>
-          </a:p>
-          <a:p>
-            <a:r>
-              <a:rPr lang="en-US" dirty="0"/>
-              <a:t>Differential expression analysis</a:t>
-            </a:r>
-          </a:p>
-          <a:p>
-            <a:r>
-              <a:rPr lang="en-US" dirty="0"/>
-              <a:t>Result visualization</a:t>
+              <a:t>Michael Love, Wolfgang Huber, and Simon Anders (2014)</a:t>
+            </a:r>
+          </a:p>
+          <a:p>
+            <a:r>
+              <a:rPr lang="en-US" dirty="0"/>
+              <a:t>Identify differentially expressed genes (DEGs)</a:t>
+            </a:r>
+          </a:p>
+          <a:p>
+            <a:r>
+              <a:rPr lang="en-US" dirty="0"/>
+              <a:t>Generalized linear model (GLM) based on the negative binomial distribution</a:t>
             </a:r>
           </a:p>
         </p:txBody>
@@ -7651,7 +7676,7 @@
     </p:spTree>
     <p:extLst>
       <p:ext uri="{BB962C8B-B14F-4D97-AF65-F5344CB8AC3E}">
-        <p14:creationId xmlns:p14="http://schemas.microsoft.com/office/powerpoint/2010/main" val="2300574271"/>
+        <p14:creationId xmlns:p14="http://schemas.microsoft.com/office/powerpoint/2010/main" val="2331975794"/>
       </p:ext>
     </p:extLst>
   </p:cSld>

</xml_diff>